<commit_message>
Update Implementation of a Telerobotic Application with Gesture Recognition - Report.pptx
</commit_message>
<xml_diff>
--- a/Implementation of a Telerobotic Application with Gesture Recognition - Report.pptx
+++ b/Implementation of a Telerobotic Application with Gesture Recognition - Report.pptx
@@ -4074,6 +4074,45 @@
                 <a:latin typeface="Rockwell" panose="02060603020205020403" pitchFamily="18" charset="0"/>
               </a:rPr>
               <a:t>Implementation of a Telerobotic Application with Gesture Recognition from EMG Signals</a:t>
+            </a:r>
+          </a:p>
+        </p:txBody>
+      </p:sp>
+      <p:sp>
+        <p:nvSpPr>
+          <p:cNvPr id="3" name="TextBox 2">
+            <a:extLst>
+              <a:ext uri="{FF2B5EF4-FFF2-40B4-BE49-F238E27FC236}">
+                <a16:creationId xmlns:a16="http://schemas.microsoft.com/office/drawing/2014/main" id="{A7BCD92E-72CF-028F-69B5-8EBC3EFA9198}"/>
+              </a:ext>
+            </a:extLst>
+          </p:cNvPr>
+          <p:cNvSpPr txBox="1"/>
+          <p:nvPr/>
+        </p:nvSpPr>
+        <p:spPr>
+          <a:xfrm>
+            <a:off x="3939665" y="3808456"/>
+            <a:ext cx="4307589" cy="369332"/>
+          </a:xfrm>
+          <a:prstGeom prst="rect">
+            <a:avLst/>
+          </a:prstGeom>
+          <a:noFill/>
+        </p:spPr>
+        <p:txBody>
+          <a:bodyPr wrap="none" rtlCol="0">
+            <a:spAutoFit/>
+          </a:bodyPr>
+          <a:lstStyle/>
+          <a:p>
+            <a:r>
+              <a:rPr lang="en-ID" dirty="0">
+                <a:solidFill>
+                  <a:schemeClr val="bg1"/>
+                </a:solidFill>
+              </a:rPr>
+              <a:t>https://github.com/mahasiswateladan/emg</a:t>
             </a:r>
           </a:p>
         </p:txBody>
@@ -7690,14 +7729,6 @@
 </file>
 
 <file path=customXml/item1.xml><?xml version="1.0" encoding="utf-8"?>
-<p:properties xmlns:p="http://schemas.microsoft.com/office/2006/metadata/properties" xmlns:xsi="http://www.w3.org/2001/XMLSchema-instance" xmlns:pc="http://schemas.microsoft.com/office/infopath/2007/PartnerControls">
-  <documentManagement>
-    <MediaServiceKeyPoints xmlns="71af3243-3dd4-4a8d-8c0d-dd76da1f02a5" xsi:nil="true"/>
-  </documentManagement>
-</p:properties>
-</file>
-
-<file path=customXml/item2.xml><?xml version="1.0" encoding="utf-8"?>
 <ct:contentTypeSchema xmlns:ct="http://schemas.microsoft.com/office/2006/metadata/contentType" xmlns:ma="http://schemas.microsoft.com/office/2006/metadata/properties/metaAttributes" ct:_="" ma:_="" ma:contentTypeName="Document" ma:contentTypeID="0x01010079F111ED35F8CC479449609E8A0923A6" ma:contentTypeVersion="11" ma:contentTypeDescription="Create a new document." ma:contentTypeScope="" ma:versionID="96291512c1ee715ab617f4c07df79fc1">
   <xsd:schema xmlns:xsd="http://www.w3.org/2001/XMLSchema" xmlns:xs="http://www.w3.org/2001/XMLSchema" xmlns:p="http://schemas.microsoft.com/office/2006/metadata/properties" xmlns:ns2="71af3243-3dd4-4a8d-8c0d-dd76da1f02a5" xmlns:ns3="16c05727-aa75-4e4a-9b5f-8a80a1165891" targetNamespace="http://schemas.microsoft.com/office/2006/metadata/properties" ma:root="true" ma:fieldsID="8256c27c40ca5c40ce1cf6c44f0205df" ns2:_="" ns3:_="">
     <xsd:import namespace="71af3243-3dd4-4a8d-8c0d-dd76da1f02a5"/>
@@ -7908,6 +7939,14 @@
 </ct:contentTypeSchema>
 </file>
 
+<file path=customXml/item2.xml><?xml version="1.0" encoding="utf-8"?>
+<p:properties xmlns:p="http://schemas.microsoft.com/office/2006/metadata/properties" xmlns:xsi="http://www.w3.org/2001/XMLSchema-instance" xmlns:pc="http://schemas.microsoft.com/office/infopath/2007/PartnerControls">
+  <documentManagement>
+    <MediaServiceKeyPoints xmlns="71af3243-3dd4-4a8d-8c0d-dd76da1f02a5" xsi:nil="true"/>
+  </documentManagement>
+</p:properties>
+</file>
+
 <file path=customXml/item3.xml><?xml version="1.0" encoding="utf-8"?>
 <?mso-contentType ?>
 <FormTemplates xmlns="http://schemas.microsoft.com/sharepoint/v3/contenttype/forms">
@@ -7918,16 +7957,6 @@
 </file>
 
 <file path=customXml/itemProps1.xml><?xml version="1.0" encoding="utf-8"?>
-<ds:datastoreItem xmlns:ds="http://schemas.openxmlformats.org/officeDocument/2006/customXml" ds:itemID="{3D6CA70E-ED75-4FF0-A862-8EF12B737755}">
-  <ds:schemaRefs>
-    <ds:schemaRef ds:uri="http://schemas.microsoft.com/office/2006/metadata/properties"/>
-    <ds:schemaRef ds:uri="http://schemas.microsoft.com/office/infopath/2007/PartnerControls"/>
-    <ds:schemaRef ds:uri="71af3243-3dd4-4a8d-8c0d-dd76da1f02a5"/>
-  </ds:schemaRefs>
-</ds:datastoreItem>
-</file>
-
-<file path=customXml/itemProps2.xml><?xml version="1.0" encoding="utf-8"?>
 <ds:datastoreItem xmlns:ds="http://schemas.openxmlformats.org/officeDocument/2006/customXml" ds:itemID="{79B27744-7857-4992-B755-05855FC59147}">
   <ds:schemaRefs>
     <ds:schemaRef ds:uri="http://schemas.microsoft.com/office/2006/metadata/contentType"/>
@@ -7946,6 +7975,16 @@
 </ds:datastoreItem>
 </file>
 
+<file path=customXml/itemProps2.xml><?xml version="1.0" encoding="utf-8"?>
+<ds:datastoreItem xmlns:ds="http://schemas.openxmlformats.org/officeDocument/2006/customXml" ds:itemID="{3D6CA70E-ED75-4FF0-A862-8EF12B737755}">
+  <ds:schemaRefs>
+    <ds:schemaRef ds:uri="http://schemas.microsoft.com/office/2006/metadata/properties"/>
+    <ds:schemaRef ds:uri="http://schemas.microsoft.com/office/infopath/2007/PartnerControls"/>
+    <ds:schemaRef ds:uri="71af3243-3dd4-4a8d-8c0d-dd76da1f02a5"/>
+  </ds:schemaRefs>
+</ds:datastoreItem>
+</file>
+
 <file path=customXml/itemProps3.xml><?xml version="1.0" encoding="utf-8"?>
 <ds:datastoreItem xmlns:ds="http://schemas.openxmlformats.org/officeDocument/2006/customXml" ds:itemID="{ABF1ABED-93B7-45AC-A513-2CB1FF159AFF}">
   <ds:schemaRefs>

</xml_diff>